<commit_message>
Project presentation supplement update
</commit_message>
<xml_diff>
--- a/docs/project/Jon-Paul Boyd Masters Thesis Project Presentation COVID19 Research Cockpit - supplement.pptx
+++ b/docs/project/Jon-Paul Boyd Masters Thesis Project Presentation COVID19 Research Cockpit - supplement.pptx
@@ -6482,7 +6482,7 @@
                     <a:schemeClr val="bg1"/>
                   </a:solidFill>
                 </a:rPr>
-                <a:t>* Estimated cloud costs (5K USD) to be refined following further prototyping</a:t>
+                <a:t>* Estimated cloud costs (5K USD) total to May 2020, to be refined following further prototyping</a:t>
               </a:r>
             </a:p>
             <a:p>
@@ -6807,6 +6807,94 @@
           </a:prstGeom>
         </p:spPr>
       </p:pic>
+      <p:sp>
+        <p:nvSpPr>
+          <p:cNvPr id="2" name="Title1">
+            <a:extLst>
+              <a:ext uri="{FF2B5EF4-FFF2-40B4-BE49-F238E27FC236}">
+                <a16:creationId xmlns:a16="http://schemas.microsoft.com/office/drawing/2014/main" id="{9FDCBC76-80E1-4FED-B129-8D049DB6587D}"/>
+              </a:ext>
+            </a:extLst>
+          </p:cNvPr>
+          <p:cNvSpPr/>
+          <p:nvPr/>
+        </p:nvSpPr>
+        <p:spPr>
+          <a:xfrm>
+            <a:off x="116391" y="1649939"/>
+            <a:ext cx="2295700" cy="954107"/>
+          </a:xfrm>
+          <a:prstGeom prst="rect">
+            <a:avLst/>
+          </a:prstGeom>
+        </p:spPr>
+        <p:txBody>
+          <a:bodyPr wrap="square">
+            <a:spAutoFit/>
+          </a:bodyPr>
+          <a:lstStyle/>
+          <a:p>
+            <a:pPr algn="just"/>
+            <a:r>
+              <a:rPr lang="en-GB" sz="1400" dirty="0">
+                <a:solidFill>
+                  <a:schemeClr val="bg1"/>
+                </a:solidFill>
+              </a:rPr>
+              <a:t>Number of coronavirus-related academic publications increased tremendously in 2020</a:t>
+            </a:r>
+            <a:endParaRPr lang="en-GB" sz="1050" dirty="0">
+              <a:solidFill>
+                <a:schemeClr val="bg1"/>
+              </a:solidFill>
+            </a:endParaRPr>
+          </a:p>
+        </p:txBody>
+      </p:sp>
+      <p:sp>
+        <p:nvSpPr>
+          <p:cNvPr id="4" name="Title1">
+            <a:extLst>
+              <a:ext uri="{FF2B5EF4-FFF2-40B4-BE49-F238E27FC236}">
+                <a16:creationId xmlns:a16="http://schemas.microsoft.com/office/drawing/2014/main" id="{9273C9C8-98A2-4F31-A581-DBC5C7643175}"/>
+              </a:ext>
+            </a:extLst>
+          </p:cNvPr>
+          <p:cNvSpPr/>
+          <p:nvPr/>
+        </p:nvSpPr>
+        <p:spPr>
+          <a:xfrm>
+            <a:off x="9300364" y="5027267"/>
+            <a:ext cx="2714252" cy="523220"/>
+          </a:xfrm>
+          <a:prstGeom prst="rect">
+            <a:avLst/>
+          </a:prstGeom>
+        </p:spPr>
+        <p:txBody>
+          <a:bodyPr wrap="square">
+            <a:spAutoFit/>
+          </a:bodyPr>
+          <a:lstStyle/>
+          <a:p>
+            <a:pPr algn="just"/>
+            <a:r>
+              <a:rPr lang="en-GB" sz="1400" dirty="0">
+                <a:solidFill>
+                  <a:schemeClr val="bg1"/>
+                </a:solidFill>
+              </a:rPr>
+              <a:t>Word cloud representing word frequency over 95K articles</a:t>
+            </a:r>
+            <a:endParaRPr lang="en-GB" sz="1050" dirty="0">
+              <a:solidFill>
+                <a:schemeClr val="bg1"/>
+              </a:solidFill>
+            </a:endParaRPr>
+          </a:p>
+        </p:txBody>
+      </p:sp>
     </p:spTree>
     <p:extLst>
       <p:ext uri="{BB962C8B-B14F-4D97-AF65-F5344CB8AC3E}">
@@ -6935,12 +7023,75 @@
           </a:p>
         </p:txBody>
       </p:sp>
+      <p:sp>
+        <p:nvSpPr>
+          <p:cNvPr id="2" name="Title1">
+            <a:extLst>
+              <a:ext uri="{FF2B5EF4-FFF2-40B4-BE49-F238E27FC236}">
+                <a16:creationId xmlns:a16="http://schemas.microsoft.com/office/drawing/2014/main" id="{E06E89CD-9779-4118-AA0B-68F9618B5247}"/>
+              </a:ext>
+            </a:extLst>
+          </p:cNvPr>
+          <p:cNvSpPr/>
+          <p:nvPr/>
+        </p:nvSpPr>
+        <p:spPr>
+          <a:xfrm>
+            <a:off x="0" y="584774"/>
+            <a:ext cx="3368976" cy="1384995"/>
+          </a:xfrm>
+          <a:prstGeom prst="rect">
+            <a:avLst/>
+          </a:prstGeom>
+        </p:spPr>
+        <p:txBody>
+          <a:bodyPr wrap="square">
+            <a:spAutoFit/>
+          </a:bodyPr>
+          <a:lstStyle/>
+          <a:p>
+            <a:pPr algn="just"/>
+            <a:r>
+              <a:rPr lang="en-GB" sz="1400" dirty="0">
+                <a:solidFill>
+                  <a:schemeClr val="bg1"/>
+                </a:solidFill>
+              </a:rPr>
+              <a:t>Retain words appearing frequently enough together to include as complete entities.</a:t>
+            </a:r>
+          </a:p>
+          <a:p>
+            <a:pPr algn="just"/>
+            <a:endParaRPr lang="en-GB" sz="1400" dirty="0">
+              <a:solidFill>
+                <a:schemeClr val="bg1"/>
+              </a:solidFill>
+            </a:endParaRPr>
+          </a:p>
+          <a:p>
+            <a:pPr algn="just"/>
+            <a:r>
+              <a:rPr lang="en-GB" sz="1400" dirty="0">
+                <a:solidFill>
+                  <a:schemeClr val="bg1"/>
+                </a:solidFill>
+              </a:rPr>
+              <a:t>Can be used for keyword token search, topic association, document categorisation &amp; filtering.</a:t>
+            </a:r>
+            <a:endParaRPr lang="en-GB" sz="1050" dirty="0">
+              <a:solidFill>
+                <a:schemeClr val="bg1"/>
+              </a:solidFill>
+            </a:endParaRPr>
+          </a:p>
+        </p:txBody>
+      </p:sp>
       <p:pic>
         <p:nvPicPr>
-          <p:cNvPr id="11" name="Picture 10">
+          <p:cNvPr id="3" name="Picture 2">
             <a:extLst>
               <a:ext uri="{FF2B5EF4-FFF2-40B4-BE49-F238E27FC236}">
-                <a16:creationId xmlns:a16="http://schemas.microsoft.com/office/drawing/2014/main" id="{64731DE9-521B-4F43-A0C2-70071662B488}"/>
+                <a16:creationId xmlns:a16="http://schemas.microsoft.com/office/drawing/2014/main" id="{4C7DF9D2-A5BF-47AD-A689-9381081ADB24}"/>
               </a:ext>
             </a:extLst>
           </p:cNvPr>
@@ -6957,8 +7108,8 @@
         </p:blipFill>
         <p:spPr>
           <a:xfrm>
-            <a:off x="3541508" y="644097"/>
-            <a:ext cx="7473528" cy="2760492"/>
+            <a:off x="3477718" y="652095"/>
+            <a:ext cx="7897674" cy="2841945"/>
           </a:xfrm>
           <a:prstGeom prst="rect">
             <a:avLst/>
@@ -6967,10 +7118,10 @@
       </p:pic>
       <p:pic>
         <p:nvPicPr>
-          <p:cNvPr id="4" name="Picture 3" descr="A screenshot of a cell phone&#10;&#10;Description automatically generated">
+          <p:cNvPr id="5" name="Picture 4">
             <a:extLst>
               <a:ext uri="{FF2B5EF4-FFF2-40B4-BE49-F238E27FC236}">
-                <a16:creationId xmlns:a16="http://schemas.microsoft.com/office/drawing/2014/main" id="{61E59946-6F4C-4231-84C2-C938980AB458}"/>
+                <a16:creationId xmlns:a16="http://schemas.microsoft.com/office/drawing/2014/main" id="{AEF246FA-CF04-488C-A90F-07746B0085B4}"/>
               </a:ext>
             </a:extLst>
           </p:cNvPr>
@@ -6980,90 +7131,21 @@
           <p:nvPr/>
         </p:nvPicPr>
         <p:blipFill>
-          <a:blip r:embed="rId3" cstate="print">
-            <a:extLst>
-              <a:ext uri="{28A0092B-C50C-407E-A947-70E740481C1C}">
-                <a14:useLocalDpi xmlns:a14="http://schemas.microsoft.com/office/drawing/2010/main" val="0"/>
-              </a:ext>
-            </a:extLst>
-          </a:blip>
+          <a:blip r:embed="rId3"/>
           <a:stretch>
             <a:fillRect/>
           </a:stretch>
         </p:blipFill>
         <p:spPr>
           <a:xfrm>
-            <a:off x="1176963" y="3561362"/>
-            <a:ext cx="9838073" cy="3148183"/>
+            <a:off x="2046021" y="3624202"/>
+            <a:ext cx="9329371" cy="3136361"/>
           </a:xfrm>
           <a:prstGeom prst="rect">
             <a:avLst/>
           </a:prstGeom>
         </p:spPr>
       </p:pic>
-      <p:sp>
-        <p:nvSpPr>
-          <p:cNvPr id="2" name="Title1">
-            <a:extLst>
-              <a:ext uri="{FF2B5EF4-FFF2-40B4-BE49-F238E27FC236}">
-                <a16:creationId xmlns:a16="http://schemas.microsoft.com/office/drawing/2014/main" id="{E06E89CD-9779-4118-AA0B-68F9618B5247}"/>
-              </a:ext>
-            </a:extLst>
-          </p:cNvPr>
-          <p:cNvSpPr/>
-          <p:nvPr/>
-        </p:nvSpPr>
-        <p:spPr>
-          <a:xfrm>
-            <a:off x="0" y="584774"/>
-            <a:ext cx="3368976" cy="1384995"/>
-          </a:xfrm>
-          <a:prstGeom prst="rect">
-            <a:avLst/>
-          </a:prstGeom>
-        </p:spPr>
-        <p:txBody>
-          <a:bodyPr wrap="square">
-            <a:spAutoFit/>
-          </a:bodyPr>
-          <a:lstStyle/>
-          <a:p>
-            <a:pPr algn="just"/>
-            <a:r>
-              <a:rPr lang="en-GB" sz="1400" dirty="0">
-                <a:solidFill>
-                  <a:schemeClr val="bg1"/>
-                </a:solidFill>
-              </a:rPr>
-              <a:t>Retain words appearing frequently enough together to include as complete entities.</a:t>
-            </a:r>
-          </a:p>
-          <a:p>
-            <a:pPr algn="just"/>
-            <a:endParaRPr lang="en-GB" sz="1400" dirty="0">
-              <a:solidFill>
-                <a:schemeClr val="bg1"/>
-              </a:solidFill>
-            </a:endParaRPr>
-          </a:p>
-          <a:p>
-            <a:pPr algn="just"/>
-            <a:r>
-              <a:rPr lang="en-GB" sz="1400" dirty="0">
-                <a:solidFill>
-                  <a:schemeClr val="bg1"/>
-                </a:solidFill>
-              </a:rPr>
-              <a:t>Can be used for keyword token search, topic association, document categorisation &amp; filtering.</a:t>
-            </a:r>
-            <a:endParaRPr lang="en-GB" sz="1050" dirty="0">
-              <a:solidFill>
-                <a:schemeClr val="bg1"/>
-              </a:solidFill>
-            </a:endParaRPr>
-          </a:p>
-        </p:txBody>
-      </p:sp>
     </p:spTree>
     <p:extLst>
       <p:ext uri="{BB962C8B-B14F-4D97-AF65-F5344CB8AC3E}">
@@ -8852,7 +8934,87 @@
                   <a:schemeClr val="bg1"/>
                 </a:solidFill>
               </a:rPr>
-              <a:t>Topic modelling is fully automated &amp; extracts underlying semantic structure of documents to help shape their meaning. Each topic is a collection of words. Words belonging to topics have weights, so can be used to infer dominance, &amp; perhaps also a single subfield of study a given article can be associated with e.g. virology, immunology, genetics etc. Topic models can be trained on any problem domain corpus of text. Once trained, a TM can topic classify a new document without further training. In this example, training the TM took 37 minutes, processing 95K full article texts on a 6-core desktop CPU.</a:t>
+              <a:t>Topic modelling is</a:t>
+            </a:r>
+            <a:r>
+              <a:rPr lang="en-GB" sz="1100" b="1" dirty="0">
+                <a:solidFill>
+                  <a:schemeClr val="bg1"/>
+                </a:solidFill>
+              </a:rPr>
+              <a:t> fully automated </a:t>
+            </a:r>
+            <a:r>
+              <a:rPr lang="en-GB" sz="1100" dirty="0">
+                <a:solidFill>
+                  <a:schemeClr val="bg1"/>
+                </a:solidFill>
+              </a:rPr>
+              <a:t>&amp; </a:t>
+            </a:r>
+            <a:r>
+              <a:rPr lang="en-GB" sz="1100" b="1" dirty="0">
+                <a:solidFill>
+                  <a:schemeClr val="bg1"/>
+                </a:solidFill>
+              </a:rPr>
+              <a:t>extracts underlying semantic structure of documents </a:t>
+            </a:r>
+            <a:r>
+              <a:rPr lang="en-GB" sz="1100" dirty="0">
+                <a:solidFill>
+                  <a:schemeClr val="bg1"/>
+                </a:solidFill>
+              </a:rPr>
+              <a:t>to help shape their meaning. Each topic is a collection of words. </a:t>
+            </a:r>
+            <a:r>
+              <a:rPr lang="en-GB" sz="1100" b="1" dirty="0">
+                <a:solidFill>
+                  <a:schemeClr val="bg1"/>
+                </a:solidFill>
+              </a:rPr>
+              <a:t>Words belonging to topics have weights</a:t>
+            </a:r>
+            <a:r>
+              <a:rPr lang="en-GB" sz="1100" dirty="0">
+                <a:solidFill>
+                  <a:schemeClr val="bg1"/>
+                </a:solidFill>
+              </a:rPr>
+              <a:t>, so can be used to infer dominance &amp; possibly a single subfield of study a given article can be associated with e.g. virology, immunology, genetics etc. Topic models </a:t>
+            </a:r>
+            <a:r>
+              <a:rPr lang="en-GB" sz="1100" b="1" dirty="0">
+                <a:solidFill>
+                  <a:schemeClr val="bg1"/>
+                </a:solidFill>
+              </a:rPr>
+              <a:t>can be trained on any problem domain corpus of text</a:t>
+            </a:r>
+            <a:r>
+              <a:rPr lang="en-GB" sz="1100" dirty="0">
+                <a:solidFill>
+                  <a:schemeClr val="bg1"/>
+                </a:solidFill>
+              </a:rPr>
+              <a:t>. Once trained, </a:t>
+            </a:r>
+            <a:r>
+              <a:rPr lang="en-GB" sz="1100" b="1" dirty="0">
+                <a:solidFill>
+                  <a:schemeClr val="bg1"/>
+                </a:solidFill>
+              </a:rPr>
+              <a:t>a TM can topic classify a new document without further training</a:t>
+            </a:r>
+            <a:r>
+              <a:rPr lang="en-GB" sz="1100" dirty="0">
+                <a:solidFill>
+                  <a:schemeClr val="bg1"/>
+                </a:solidFill>
+              </a:rPr>
+              <a:t>. In this example, training the TM took 37 minutes, processing 95K CORD-19 full article texts on a 6-core desktop CPU.</a:t>
             </a:r>
             <a:endParaRPr lang="en-GB" sz="900" dirty="0">
               <a:solidFill>
@@ -9072,8 +9234,8 @@
         </p:nvSpPr>
         <p:spPr>
           <a:xfrm>
-            <a:off x="6096001" y="881282"/>
-            <a:ext cx="5483902" cy="2616101"/>
+            <a:off x="5683775" y="768857"/>
+            <a:ext cx="6061017" cy="5262979"/>
           </a:xfrm>
           <a:prstGeom prst="rect">
             <a:avLst/>
@@ -9107,7 +9269,7 @@
           <a:p>
             <a:pPr algn="just"/>
             <a:r>
-              <a:rPr lang="en-GB" sz="1200" dirty="0">
+              <a:rPr lang="en-GB" sz="1600" dirty="0">
                 <a:solidFill>
                   <a:schemeClr val="bg1"/>
                 </a:solidFill>
@@ -9117,7 +9279,7 @@
           </a:p>
           <a:p>
             <a:pPr algn="just"/>
-            <a:endParaRPr lang="en-GB" sz="1200" dirty="0">
+            <a:endParaRPr lang="en-GB" sz="1600" dirty="0">
               <a:solidFill>
                 <a:schemeClr val="bg1"/>
               </a:solidFill>
@@ -9126,17 +9288,17 @@
           <a:p>
             <a:pPr algn="just"/>
             <a:r>
-              <a:rPr lang="en-GB" sz="1200" dirty="0">
+              <a:rPr lang="en-GB" sz="1600" dirty="0">
                 <a:solidFill>
                   <a:schemeClr val="bg1"/>
                 </a:solidFill>
               </a:rPr>
-              <a:t>Each dot is a document in the corpus, coloured to indicate the topic it is assigned to.</a:t>
+              <a:t>Each dot is a corpus document, coloured to indicate the assigned topic.</a:t>
             </a:r>
           </a:p>
           <a:p>
             <a:pPr algn="just"/>
-            <a:endParaRPr lang="en-GB" sz="1200" dirty="0">
+            <a:endParaRPr lang="en-GB" sz="1600" dirty="0">
               <a:solidFill>
                 <a:schemeClr val="bg1"/>
               </a:solidFill>
@@ -9145,7 +9307,7 @@
           <a:p>
             <a:pPr algn="just"/>
             <a:r>
-              <a:rPr lang="en-GB" sz="1200" dirty="0">
+              <a:rPr lang="en-GB" sz="1600" dirty="0">
                 <a:solidFill>
                   <a:schemeClr val="bg1"/>
                 </a:solidFill>
@@ -9155,7 +9317,7 @@
           </a:p>
           <a:p>
             <a:pPr algn="just"/>
-            <a:endParaRPr lang="en-GB" sz="1200" dirty="0">
+            <a:endParaRPr lang="en-GB" sz="1600" dirty="0">
               <a:solidFill>
                 <a:schemeClr val="bg1"/>
               </a:solidFill>
@@ -9164,14 +9326,52 @@
           <a:p>
             <a:pPr algn="just"/>
             <a:r>
-              <a:rPr lang="en-GB" sz="1200" dirty="0">
+              <a:rPr lang="en-GB" sz="1600" dirty="0">
                 <a:solidFill>
                   <a:schemeClr val="bg1"/>
                 </a:solidFill>
               </a:rPr>
-              <a:t>PCA also facilitates measuring distance between document vectors, for example by using Euclidean geometry, to indicates nearest neighbours, even if they belong to a different topic. This helps support discovery and new insights (especially if snippet summarisation of documents can directly answer the question being asked).</a:t>
-            </a:r>
-            <a:endParaRPr lang="en-GB" sz="2000" b="1" dirty="0">
+              <a:t>This dimensionality reduction facilitates measuring distance between document vectors, for example by using Euclidean geometry, to indicate a given document’s nearest neighbours, even if they belong to a different topic. </a:t>
+            </a:r>
+          </a:p>
+          <a:p>
+            <a:pPr algn="just"/>
+            <a:endParaRPr lang="en-GB" sz="1600" dirty="0">
+              <a:solidFill>
+                <a:schemeClr val="bg1"/>
+              </a:solidFill>
+            </a:endParaRPr>
+          </a:p>
+          <a:p>
+            <a:pPr algn="just"/>
+            <a:r>
+              <a:rPr lang="en-GB" sz="1600" dirty="0">
+                <a:solidFill>
+                  <a:schemeClr val="bg1"/>
+                </a:solidFill>
+              </a:rPr>
+              <a:t>It means a search engine can enhance a query result hitlist by including additional neighbouring documents of a document included in search results, even if that neighbour does not include the query keywords e.g. include nearby red topic documents when orange topic documents rank highly in search results (grid ref x -30, y +5)</a:t>
+            </a:r>
+          </a:p>
+          <a:p>
+            <a:pPr algn="just"/>
+            <a:endParaRPr lang="en-GB" sz="1600" dirty="0">
+              <a:solidFill>
+                <a:schemeClr val="bg1"/>
+              </a:solidFill>
+            </a:endParaRPr>
+          </a:p>
+          <a:p>
+            <a:pPr algn="just"/>
+            <a:r>
+              <a:rPr lang="en-GB" sz="1600" dirty="0">
+                <a:solidFill>
+                  <a:schemeClr val="bg1"/>
+                </a:solidFill>
+              </a:rPr>
+              <a:t>This helps support discovery and new insights.</a:t>
+            </a:r>
+            <a:endParaRPr lang="en-GB" sz="2800" b="1" dirty="0">
               <a:solidFill>
                 <a:schemeClr val="bg1"/>
               </a:solidFill>
@@ -10665,21 +10865,6 @@
 </file>
 
 <file path=customXml/item1.xml><?xml version="1.0" encoding="utf-8"?>
-<?mso-contentType ?>
-<FormTemplates xmlns="http://schemas.microsoft.com/sharepoint/v3/contenttype/forms">
-  <Display>DocumentLibraryForm</Display>
-  <Edit>DocumentLibraryForm</Edit>
-  <New>DocumentLibraryForm</New>
-</FormTemplates>
-</file>
-
-<file path=customXml/item2.xml><?xml version="1.0" encoding="utf-8"?>
-<p:properties xmlns:p="http://schemas.microsoft.com/office/2006/metadata/properties" xmlns:xsi="http://www.w3.org/2001/XMLSchema-instance">
-  <documentManagement/>
-</p:properties>
-</file>
-
-<file path=customXml/item3.xml><?xml version="1.0" encoding="utf-8"?>
 <ct:contentTypeSchema xmlns:ct="http://schemas.microsoft.com/office/2006/metadata/contentType" xmlns:ma="http://schemas.microsoft.com/office/2006/metadata/properties/metaAttributes" ct:_="" ma:_="" ma:contentTypeName="Document" ma:contentTypeID="0x0101008E7116CF2ACD1B49AD73FD6E59CDD597" ma:contentTypeVersion="1" ma:contentTypeDescription="Create a new document." ma:contentTypeScope="" ma:versionID="72bf3f12221f2bd978d60472ba775759">
   <xsd:schema xmlns:xsd="http://www.w3.org/2001/XMLSchema" xmlns:p="http://schemas.microsoft.com/office/2006/metadata/properties" targetNamespace="http://schemas.microsoft.com/office/2006/metadata/properties" ma:root="true" ma:fieldsID="54cdae859f44ac3acdb7285e96c8ed0f">
     <xsd:element name="properties">
@@ -10728,10 +10913,32 @@
 </ct:contentTypeSchema>
 </file>
 
+<file path=customXml/item2.xml><?xml version="1.0" encoding="utf-8"?>
+<p:properties xmlns:p="http://schemas.microsoft.com/office/2006/metadata/properties" xmlns:xsi="http://www.w3.org/2001/XMLSchema-instance">
+  <documentManagement/>
+</p:properties>
+</file>
+
+<file path=customXml/item3.xml><?xml version="1.0" encoding="utf-8"?>
+<?mso-contentType ?>
+<FormTemplates xmlns="http://schemas.microsoft.com/sharepoint/v3/contenttype/forms">
+  <Display>DocumentLibraryForm</Display>
+  <Edit>DocumentLibraryForm</Edit>
+  <New>DocumentLibraryForm</New>
+</FormTemplates>
+</file>
+
 <file path=customXml/itemProps1.xml><?xml version="1.0" encoding="utf-8"?>
-<ds:datastoreItem xmlns:ds="http://schemas.openxmlformats.org/officeDocument/2006/customXml" ds:itemID="{D44EE68D-88EC-4D16-8BCE-34AF1A8C2E9D}">
+<ds:datastoreItem xmlns:ds="http://schemas.openxmlformats.org/officeDocument/2006/customXml" ds:itemID="{C26A1512-674B-407E-9125-A001EB637C7B}">
   <ds:schemaRefs>
-    <ds:schemaRef ds:uri="http://schemas.microsoft.com/sharepoint/v3/contenttype/forms"/>
+    <ds:schemaRef ds:uri="http://schemas.microsoft.com/office/2006/metadata/contentType"/>
+    <ds:schemaRef ds:uri="http://schemas.microsoft.com/office/2006/metadata/properties/metaAttributes"/>
+    <ds:schemaRef ds:uri="http://www.w3.org/2001/XMLSchema"/>
+    <ds:schemaRef ds:uri="http://schemas.microsoft.com/office/2006/metadata/properties"/>
+    <ds:schemaRef ds:uri="http://schemas.openxmlformats.org/package/2006/metadata/core-properties"/>
+    <ds:schemaRef ds:uri="http://purl.org/dc/elements/1.1/"/>
+    <ds:schemaRef ds:uri="http://purl.org/dc/terms/"/>
+    <ds:schemaRef ds:uri="http://schemas.microsoft.com/office/internal/2005/internalDocumentation"/>
   </ds:schemaRefs>
 </ds:datastoreItem>
 </file>
@@ -10751,16 +10958,9 @@
 </file>
 
 <file path=customXml/itemProps3.xml><?xml version="1.0" encoding="utf-8"?>
-<ds:datastoreItem xmlns:ds="http://schemas.openxmlformats.org/officeDocument/2006/customXml" ds:itemID="{C26A1512-674B-407E-9125-A001EB637C7B}">
+<ds:datastoreItem xmlns:ds="http://schemas.openxmlformats.org/officeDocument/2006/customXml" ds:itemID="{D44EE68D-88EC-4D16-8BCE-34AF1A8C2E9D}">
   <ds:schemaRefs>
-    <ds:schemaRef ds:uri="http://schemas.microsoft.com/office/2006/metadata/contentType"/>
-    <ds:schemaRef ds:uri="http://schemas.microsoft.com/office/2006/metadata/properties/metaAttributes"/>
-    <ds:schemaRef ds:uri="http://www.w3.org/2001/XMLSchema"/>
-    <ds:schemaRef ds:uri="http://schemas.microsoft.com/office/2006/metadata/properties"/>
-    <ds:schemaRef ds:uri="http://schemas.openxmlformats.org/package/2006/metadata/core-properties"/>
-    <ds:schemaRef ds:uri="http://purl.org/dc/elements/1.1/"/>
-    <ds:schemaRef ds:uri="http://purl.org/dc/terms/"/>
-    <ds:schemaRef ds:uri="http://schemas.microsoft.com/office/internal/2005/internalDocumentation"/>
+    <ds:schemaRef ds:uri="http://schemas.microsoft.com/sharepoint/v3/contenttype/forms"/>
   </ds:schemaRefs>
 </ds:datastoreItem>
 </file>
</xml_diff>